<commit_message>
Test levels and test types
</commit_message>
<xml_diff>
--- a/06_test_levels_and_types.pptx
+++ b/06_test_levels_and_types.pptx
@@ -4128,7 +4128,7 @@
         <p:spPr>
           <a:xfrm>
             <a:off x="685800" y="2130480"/>
-            <a:ext cx="7770240" cy="1467720"/>
+            <a:ext cx="7769880" cy="1467360"/>
           </a:xfrm>
           <a:prstGeom prst="rect">
             <a:avLst/>
@@ -4175,7 +4175,7 @@
         <p:spPr>
           <a:xfrm>
             <a:off x="1371600" y="3886200"/>
-            <a:ext cx="6398640" cy="1750320"/>
+            <a:ext cx="6398280" cy="1749960"/>
           </a:xfrm>
           <a:prstGeom prst="rect">
             <a:avLst/>
@@ -4250,7 +4250,7 @@
         <p:spPr>
           <a:xfrm>
             <a:off x="838080" y="685800"/>
-            <a:ext cx="8227440" cy="1140840"/>
+            <a:ext cx="8227080" cy="1140480"/>
           </a:xfrm>
           <a:prstGeom prst="rect">
             <a:avLst/>
@@ -4297,7 +4297,7 @@
         <p:spPr>
           <a:xfrm>
             <a:off x="762120" y="1676520"/>
-            <a:ext cx="7846560" cy="4523760"/>
+            <a:ext cx="7846200" cy="4523400"/>
           </a:xfrm>
           <a:prstGeom prst="rect">
             <a:avLst/>
@@ -4322,7 +4322,7 @@
               </a:lnSpc>
               <a:buSzPct val="45000"/>
               <a:buFont typeface="StarSymbol"/>
-              <a:buChar char=""/>
+              <a:buChar char="l"/>
             </a:pPr>
             <a:r>
               <a:rPr lang="en-GB" sz="3200" strike="noStrike">
@@ -4343,7 +4343,7 @@
               </a:lnSpc>
               <a:buSzPct val="45000"/>
               <a:buFont typeface="StarSymbol"/>
-              <a:buChar char=""/>
+              <a:buChar char="l"/>
             </a:pPr>
             <a:r>
               <a:rPr lang="en-GB" sz="3200" strike="noStrike">
@@ -4417,7 +4417,7 @@
         <p:spPr>
           <a:xfrm>
             <a:off x="838080" y="685800"/>
-            <a:ext cx="8227440" cy="1140840"/>
+            <a:ext cx="8227080" cy="1140480"/>
           </a:xfrm>
           <a:prstGeom prst="rect">
             <a:avLst/>
@@ -4464,7 +4464,7 @@
         <p:spPr>
           <a:xfrm>
             <a:off x="762120" y="1676520"/>
-            <a:ext cx="7846560" cy="4523760"/>
+            <a:ext cx="7846200" cy="4523400"/>
           </a:xfrm>
           <a:prstGeom prst="rect">
             <a:avLst/>
@@ -4489,7 +4489,7 @@
               </a:lnSpc>
               <a:buSzPct val="45000"/>
               <a:buFont typeface="StarSymbol"/>
-              <a:buChar char=""/>
+              <a:buChar char="l"/>
             </a:pPr>
             <a:r>
               <a:rPr lang="en-GB" sz="3200" strike="noStrike">
@@ -4510,7 +4510,7 @@
               </a:lnSpc>
               <a:buSzPct val="45000"/>
               <a:buFont typeface="StarSymbol"/>
-              <a:buChar char=""/>
+              <a:buChar char="l"/>
             </a:pPr>
             <a:r>
               <a:rPr lang="en-GB" sz="3200" strike="noStrike">
@@ -4531,7 +4531,7 @@
               </a:lnSpc>
               <a:buSzPct val="45000"/>
               <a:buFont typeface="StarSymbol"/>
-              <a:buChar char=""/>
+              <a:buChar char="l"/>
             </a:pPr>
             <a:r>
               <a:rPr lang="en-GB" sz="3200" strike="noStrike">
@@ -4552,7 +4552,7 @@
               </a:lnSpc>
               <a:buSzPct val="45000"/>
               <a:buFont typeface="StarSymbol"/>
-              <a:buChar char=""/>
+              <a:buChar char="l"/>
             </a:pPr>
             <a:r>
               <a:rPr lang="en-GB" sz="3200" strike="noStrike">
@@ -4573,7 +4573,7 @@
               </a:lnSpc>
               <a:buSzPct val="45000"/>
               <a:buFont typeface="StarSymbol"/>
-              <a:buChar char=""/>
+              <a:buChar char="l"/>
             </a:pPr>
             <a:r>
               <a:rPr lang="en-GB" sz="3200" strike="noStrike">
@@ -4647,7 +4647,7 @@
         <p:spPr>
           <a:xfrm>
             <a:off x="838080" y="685800"/>
-            <a:ext cx="8227440" cy="1140840"/>
+            <a:ext cx="8227080" cy="1140480"/>
           </a:xfrm>
           <a:prstGeom prst="rect">
             <a:avLst/>
@@ -4694,7 +4694,7 @@
         <p:spPr>
           <a:xfrm>
             <a:off x="762120" y="1676520"/>
-            <a:ext cx="7846560" cy="4523760"/>
+            <a:ext cx="7846200" cy="4523400"/>
           </a:xfrm>
           <a:prstGeom prst="rect">
             <a:avLst/>
@@ -4719,7 +4719,7 @@
               </a:lnSpc>
               <a:buSzPct val="45000"/>
               <a:buFont typeface="StarSymbol"/>
-              <a:buChar char=""/>
+              <a:buChar char="l"/>
             </a:pPr>
             <a:r>
               <a:rPr lang="en-GB" sz="3200" strike="noStrike">
@@ -4740,7 +4740,7 @@
               </a:lnSpc>
               <a:buSzPct val="45000"/>
               <a:buFont typeface="StarSymbol"/>
-              <a:buChar char=""/>
+              <a:buChar char="l"/>
             </a:pPr>
             <a:r>
               <a:rPr lang="en-GB" sz="3200" strike="noStrike">
@@ -4769,7 +4769,7 @@
         <p:spPr>
           <a:xfrm>
             <a:off x="4392000" y="4672800"/>
-            <a:ext cx="4600080" cy="2095200"/>
+            <a:ext cx="4599720" cy="2094840"/>
           </a:xfrm>
           <a:prstGeom prst="rect">
             <a:avLst/>
@@ -4837,7 +4837,7 @@
         <p:spPr>
           <a:xfrm>
             <a:off x="838080" y="685800"/>
-            <a:ext cx="8227440" cy="1140840"/>
+            <a:ext cx="8227080" cy="1140480"/>
           </a:xfrm>
           <a:prstGeom prst="rect">
             <a:avLst/>
@@ -4884,7 +4884,7 @@
         <p:spPr>
           <a:xfrm>
             <a:off x="762120" y="1676520"/>
-            <a:ext cx="7846560" cy="4523760"/>
+            <a:ext cx="7846200" cy="4523400"/>
           </a:xfrm>
           <a:prstGeom prst="rect">
             <a:avLst/>
@@ -4909,7 +4909,7 @@
               </a:lnSpc>
               <a:buSzPct val="45000"/>
               <a:buFont typeface="StarSymbol"/>
-              <a:buChar char=""/>
+              <a:buChar char="l"/>
             </a:pPr>
             <a:r>
               <a:rPr lang="en-GB" sz="3200" strike="noStrike">
@@ -4930,7 +4930,7 @@
               </a:lnSpc>
               <a:buSzPct val="45000"/>
               <a:buFont typeface="StarSymbol"/>
-              <a:buChar char=""/>
+              <a:buChar char="l"/>
             </a:pPr>
             <a:r>
               <a:rPr lang="en-GB" sz="3200" strike="noStrike">
@@ -4951,7 +4951,7 @@
               </a:lnSpc>
               <a:buSzPct val="45000"/>
               <a:buFont typeface="StarSymbol"/>
-              <a:buChar char=""/>
+              <a:buChar char="l"/>
             </a:pPr>
             <a:r>
               <a:rPr lang="en-GB" sz="3200" strike="noStrike">
@@ -4972,7 +4972,7 @@
               </a:lnSpc>
               <a:buSzPct val="45000"/>
               <a:buFont typeface="StarSymbol"/>
-              <a:buChar char=""/>
+              <a:buChar char="l"/>
             </a:pPr>
             <a:r>
               <a:rPr lang="en-GB" sz="3200" strike="noStrike">
@@ -4993,7 +4993,7 @@
               </a:lnSpc>
               <a:buSzPct val="45000"/>
               <a:buFont typeface="StarSymbol"/>
-              <a:buChar char=""/>
+              <a:buChar char="l"/>
             </a:pPr>
             <a:r>
               <a:rPr lang="en-GB" sz="3200" strike="noStrike">
@@ -5067,7 +5067,7 @@
         <p:spPr>
           <a:xfrm>
             <a:off x="838080" y="685800"/>
-            <a:ext cx="8227440" cy="1140840"/>
+            <a:ext cx="8227080" cy="1140480"/>
           </a:xfrm>
           <a:prstGeom prst="rect">
             <a:avLst/>
@@ -5114,7 +5114,7 @@
         <p:spPr>
           <a:xfrm>
             <a:off x="762120" y="1676520"/>
-            <a:ext cx="7846560" cy="4523760"/>
+            <a:ext cx="7846200" cy="4523400"/>
           </a:xfrm>
           <a:prstGeom prst="rect">
             <a:avLst/>
@@ -5139,7 +5139,7 @@
               </a:lnSpc>
               <a:buSzPct val="45000"/>
               <a:buFont typeface="StarSymbol"/>
-              <a:buChar char=""/>
+              <a:buChar char="l"/>
             </a:pPr>
             <a:r>
               <a:rPr lang="en-GB" sz="3200" strike="noStrike">
@@ -5160,7 +5160,7 @@
               </a:lnSpc>
               <a:buSzPct val="45000"/>
               <a:buFont typeface="StarSymbol"/>
-              <a:buChar char=""/>
+              <a:buChar char="l"/>
             </a:pPr>
             <a:r>
               <a:rPr lang="en-GB" sz="3200" strike="noStrike">
@@ -5189,7 +5189,7 @@
         <p:spPr>
           <a:xfrm>
             <a:off x="4968000" y="4237920"/>
-            <a:ext cx="3809520" cy="2314080"/>
+            <a:ext cx="3809160" cy="2313720"/>
           </a:xfrm>
           <a:prstGeom prst="rect">
             <a:avLst/>
@@ -5257,7 +5257,7 @@
         <p:spPr>
           <a:xfrm>
             <a:off x="838080" y="685800"/>
-            <a:ext cx="8227440" cy="1140840"/>
+            <a:ext cx="8227080" cy="1140480"/>
           </a:xfrm>
           <a:prstGeom prst="rect">
             <a:avLst/>
@@ -5304,7 +5304,7 @@
         <p:spPr>
           <a:xfrm>
             <a:off x="762120" y="1676520"/>
-            <a:ext cx="7846560" cy="4523760"/>
+            <a:ext cx="7846200" cy="4523400"/>
           </a:xfrm>
           <a:prstGeom prst="rect">
             <a:avLst/>
@@ -5329,7 +5329,7 @@
               </a:lnSpc>
               <a:buSzPct val="45000"/>
               <a:buFont typeface="StarSymbol"/>
-              <a:buChar char=""/>
+              <a:buChar char="l"/>
             </a:pPr>
             <a:r>
               <a:rPr lang="en-GB" sz="3200" strike="noStrike">
@@ -5350,7 +5350,7 @@
               </a:lnSpc>
               <a:buSzPct val="45000"/>
               <a:buFont typeface="StarSymbol"/>
-              <a:buChar char=""/>
+              <a:buChar char="l"/>
             </a:pPr>
             <a:r>
               <a:rPr lang="en-GB" sz="3200" strike="noStrike">
@@ -5371,7 +5371,7 @@
               </a:lnSpc>
               <a:buSzPct val="45000"/>
               <a:buFont typeface="StarSymbol"/>
-              <a:buChar char=""/>
+              <a:buChar char="l"/>
             </a:pPr>
             <a:r>
               <a:rPr lang="en-GB" sz="3200" strike="noStrike">
@@ -5445,7 +5445,7 @@
         <p:spPr>
           <a:xfrm>
             <a:off x="838080" y="685800"/>
-            <a:ext cx="8227440" cy="1140840"/>
+            <a:ext cx="8227080" cy="1140480"/>
           </a:xfrm>
           <a:prstGeom prst="rect">
             <a:avLst/>
@@ -5492,7 +5492,7 @@
         <p:spPr>
           <a:xfrm>
             <a:off x="762120" y="1676520"/>
-            <a:ext cx="7846560" cy="4523760"/>
+            <a:ext cx="7846200" cy="4523400"/>
           </a:xfrm>
           <a:prstGeom prst="rect">
             <a:avLst/>
@@ -5517,7 +5517,7 @@
               </a:lnSpc>
               <a:buSzPct val="45000"/>
               <a:buFont typeface="StarSymbol"/>
-              <a:buChar char=""/>
+              <a:buChar char="l"/>
             </a:pPr>
             <a:r>
               <a:rPr lang="en-GB" sz="3200" strike="noStrike">
@@ -5538,7 +5538,7 @@
               </a:lnSpc>
               <a:buSzPct val="45000"/>
               <a:buFont typeface="StarSymbol"/>
-              <a:buChar char=""/>
+              <a:buChar char="l"/>
             </a:pPr>
             <a:r>
               <a:rPr lang="en-GB" sz="3200" strike="noStrike">
@@ -5559,7 +5559,7 @@
               </a:lnSpc>
               <a:buSzPct val="45000"/>
               <a:buFont typeface="StarSymbol"/>
-              <a:buChar char=""/>
+              <a:buChar char="l"/>
             </a:pPr>
             <a:r>
               <a:rPr lang="en-GB" sz="3200" strike="noStrike">
@@ -5580,7 +5580,7 @@
               </a:lnSpc>
               <a:buSzPct val="45000"/>
               <a:buFont typeface="StarSymbol"/>
-              <a:buChar char=""/>
+              <a:buChar char="l"/>
             </a:pPr>
             <a:r>
               <a:rPr lang="en-GB" sz="3200" strike="noStrike">
@@ -5654,7 +5654,7 @@
         <p:spPr>
           <a:xfrm>
             <a:off x="838080" y="685800"/>
-            <a:ext cx="8227440" cy="1140840"/>
+            <a:ext cx="8227080" cy="1140480"/>
           </a:xfrm>
           <a:prstGeom prst="rect">
             <a:avLst/>
@@ -5701,7 +5701,7 @@
         <p:spPr>
           <a:xfrm>
             <a:off x="762120" y="1676520"/>
-            <a:ext cx="7846560" cy="4523760"/>
+            <a:ext cx="7846200" cy="4523400"/>
           </a:xfrm>
           <a:prstGeom prst="rect">
             <a:avLst/>
@@ -5726,7 +5726,7 @@
               </a:lnSpc>
               <a:buSzPct val="45000"/>
               <a:buFont typeface="StarSymbol"/>
-              <a:buChar char=""/>
+              <a:buChar char="l"/>
             </a:pPr>
             <a:r>
               <a:rPr lang="en-GB" sz="3200" strike="noStrike">
@@ -5747,7 +5747,7 @@
               </a:lnSpc>
               <a:buSzPct val="45000"/>
               <a:buFont typeface="StarSymbol"/>
-              <a:buChar char=""/>
+              <a:buChar char="l"/>
             </a:pPr>
             <a:r>
               <a:rPr lang="en-GB" sz="3200" strike="noStrike">
@@ -5821,7 +5821,7 @@
         <p:spPr>
           <a:xfrm>
             <a:off x="838080" y="685800"/>
-            <a:ext cx="8227440" cy="1140840"/>
+            <a:ext cx="8227080" cy="1140480"/>
           </a:xfrm>
           <a:prstGeom prst="rect">
             <a:avLst/>
@@ -5868,7 +5868,7 @@
         <p:spPr>
           <a:xfrm>
             <a:off x="762120" y="1676520"/>
-            <a:ext cx="7846560" cy="4523760"/>
+            <a:ext cx="7846200" cy="4523400"/>
           </a:xfrm>
           <a:prstGeom prst="rect">
             <a:avLst/>
@@ -5893,7 +5893,7 @@
               </a:lnSpc>
               <a:buSzPct val="45000"/>
               <a:buFont typeface="StarSymbol"/>
-              <a:buChar char=""/>
+              <a:buChar char="l"/>
             </a:pPr>
             <a:r>
               <a:rPr lang="en-GB" sz="3200" strike="noStrike">
@@ -5914,7 +5914,7 @@
               </a:lnSpc>
               <a:buSzPct val="45000"/>
               <a:buFont typeface="StarSymbol"/>
-              <a:buChar char=""/>
+              <a:buChar char="l"/>
             </a:pPr>
             <a:r>
               <a:rPr lang="en-GB" sz="3200" strike="noStrike">
@@ -5935,7 +5935,7 @@
               </a:lnSpc>
               <a:buSzPct val="45000"/>
               <a:buFont typeface="StarSymbol"/>
-              <a:buChar char=""/>
+              <a:buChar char="l"/>
             </a:pPr>
             <a:r>
               <a:rPr lang="en-GB" sz="3200" strike="noStrike">
@@ -6009,7 +6009,7 @@
         <p:spPr>
           <a:xfrm>
             <a:off x="838080" y="685800"/>
-            <a:ext cx="8227440" cy="1140840"/>
+            <a:ext cx="8227080" cy="1140480"/>
           </a:xfrm>
           <a:prstGeom prst="rect">
             <a:avLst/>
@@ -6056,7 +6056,7 @@
         <p:spPr>
           <a:xfrm>
             <a:off x="762120" y="1676520"/>
-            <a:ext cx="7846560" cy="4523760"/>
+            <a:ext cx="7846200" cy="4523400"/>
           </a:xfrm>
           <a:prstGeom prst="rect">
             <a:avLst/>
@@ -6081,7 +6081,7 @@
               </a:lnSpc>
               <a:buSzPct val="45000"/>
               <a:buFont typeface="StarSymbol"/>
-              <a:buChar char=""/>
+              <a:buChar char="l"/>
             </a:pPr>
             <a:r>
               <a:rPr lang="en-GB" sz="3200" strike="noStrike">
@@ -6110,7 +6110,7 @@
         <p:spPr>
           <a:xfrm>
             <a:off x="936000" y="3672000"/>
-            <a:ext cx="7254360" cy="2480760"/>
+            <a:ext cx="7254000" cy="2480400"/>
           </a:xfrm>
           <a:prstGeom prst="rect">
             <a:avLst/>
@@ -6178,7 +6178,7 @@
         <p:spPr>
           <a:xfrm>
             <a:off x="838080" y="685800"/>
-            <a:ext cx="8227440" cy="1140840"/>
+            <a:ext cx="8227080" cy="1140480"/>
           </a:xfrm>
           <a:prstGeom prst="rect">
             <a:avLst/>
@@ -6225,7 +6225,7 @@
         <p:spPr>
           <a:xfrm>
             <a:off x="762120" y="1676520"/>
-            <a:ext cx="7846560" cy="4523760"/>
+            <a:ext cx="7846200" cy="4523400"/>
           </a:xfrm>
           <a:prstGeom prst="rect">
             <a:avLst/>
@@ -6250,7 +6250,7 @@
               </a:lnSpc>
               <a:buSzPct val="45000"/>
               <a:buFont typeface="StarSymbol"/>
-              <a:buChar char=""/>
+              <a:buChar char="l"/>
             </a:pPr>
             <a:r>
               <a:rPr lang="en-GB" sz="3200" strike="noStrike">
@@ -6271,7 +6271,7 @@
               </a:lnSpc>
               <a:buSzPct val="45000"/>
               <a:buFont typeface="StarSymbol"/>
-              <a:buChar char=""/>
+              <a:buChar char="l"/>
             </a:pPr>
             <a:r>
               <a:rPr lang="en-GB" sz="3200" strike="noStrike">
@@ -6292,7 +6292,7 @@
               </a:lnSpc>
               <a:buSzPct val="45000"/>
               <a:buFont typeface="StarSymbol"/>
-              <a:buChar char=""/>
+              <a:buChar char="l"/>
             </a:pPr>
             <a:r>
               <a:rPr lang="en-GB" sz="3200" strike="noStrike">
@@ -6313,7 +6313,7 @@
               </a:lnSpc>
               <a:buSzPct val="45000"/>
               <a:buFont typeface="StarSymbol"/>
-              <a:buChar char=""/>
+              <a:buChar char="l"/>
             </a:pPr>
             <a:r>
               <a:rPr lang="en-GB" sz="3200" strike="noStrike">
@@ -6387,7 +6387,7 @@
         <p:spPr>
           <a:xfrm>
             <a:off x="838080" y="685800"/>
-            <a:ext cx="8227440" cy="1140840"/>
+            <a:ext cx="8227080" cy="1140480"/>
           </a:xfrm>
           <a:prstGeom prst="rect">
             <a:avLst/>
@@ -6434,7 +6434,7 @@
         <p:spPr>
           <a:xfrm>
             <a:off x="762120" y="1676520"/>
-            <a:ext cx="7846560" cy="4523760"/>
+            <a:ext cx="7846200" cy="4523400"/>
           </a:xfrm>
           <a:prstGeom prst="rect">
             <a:avLst/>
@@ -6459,7 +6459,7 @@
               </a:lnSpc>
               <a:buSzPct val="45000"/>
               <a:buFont typeface="StarSymbol"/>
-              <a:buChar char=""/>
+              <a:buChar char="l"/>
             </a:pPr>
             <a:r>
               <a:rPr lang="en-GB" sz="3200" strike="noStrike">
@@ -6480,7 +6480,7 @@
               </a:lnSpc>
               <a:buSzPct val="45000"/>
               <a:buFont typeface="StarSymbol"/>
-              <a:buChar char=""/>
+              <a:buChar char="l"/>
             </a:pPr>
             <a:r>
               <a:rPr lang="en-GB" sz="3200" strike="noStrike">
@@ -6554,7 +6554,7 @@
         <p:spPr>
           <a:xfrm>
             <a:off x="838080" y="685800"/>
-            <a:ext cx="8227440" cy="1140840"/>
+            <a:ext cx="8227080" cy="1140480"/>
           </a:xfrm>
           <a:prstGeom prst="rect">
             <a:avLst/>
@@ -6601,7 +6601,7 @@
         <p:spPr>
           <a:xfrm>
             <a:off x="762120" y="1676520"/>
-            <a:ext cx="7846560" cy="4523760"/>
+            <a:ext cx="7846200" cy="4523400"/>
           </a:xfrm>
           <a:prstGeom prst="rect">
             <a:avLst/>
@@ -6626,7 +6626,7 @@
               </a:lnSpc>
               <a:buSzPct val="45000"/>
               <a:buFont typeface="StarSymbol"/>
-              <a:buChar char=""/>
+              <a:buChar char="l"/>
             </a:pPr>
             <a:r>
               <a:rPr lang="en-GB" sz="3200" strike="noStrike">
@@ -6647,7 +6647,7 @@
               </a:lnSpc>
               <a:buSzPct val="45000"/>
               <a:buFont typeface="StarSymbol"/>
-              <a:buChar char=""/>
+              <a:buChar char="l"/>
             </a:pPr>
             <a:r>
               <a:rPr lang="en-GB" sz="3200" strike="noStrike">
@@ -6668,7 +6668,7 @@
               </a:lnSpc>
               <a:buSzPct val="45000"/>
               <a:buFont typeface="StarSymbol"/>
-              <a:buChar char=""/>
+              <a:buChar char="l"/>
             </a:pPr>
             <a:r>
               <a:rPr lang="en-GB" sz="3200" strike="noStrike">
@@ -6689,7 +6689,7 @@
               </a:lnSpc>
               <a:buSzPct val="45000"/>
               <a:buFont typeface="StarSymbol"/>
-              <a:buChar char=""/>
+              <a:buChar char="l"/>
             </a:pPr>
             <a:r>
               <a:rPr lang="en-GB" sz="3200" strike="noStrike">
@@ -6763,7 +6763,7 @@
         <p:spPr>
           <a:xfrm>
             <a:off x="838080" y="685800"/>
-            <a:ext cx="8227440" cy="1140840"/>
+            <a:ext cx="8227080" cy="1140480"/>
           </a:xfrm>
           <a:prstGeom prst="rect">
             <a:avLst/>
@@ -6810,7 +6810,7 @@
         <p:spPr>
           <a:xfrm>
             <a:off x="762120" y="1676520"/>
-            <a:ext cx="7846560" cy="4523760"/>
+            <a:ext cx="7846200" cy="4523400"/>
           </a:xfrm>
           <a:prstGeom prst="rect">
             <a:avLst/>
@@ -6835,7 +6835,7 @@
               </a:lnSpc>
               <a:buSzPct val="45000"/>
               <a:buFont typeface="StarSymbol"/>
-              <a:buChar char=""/>
+              <a:buChar char="l"/>
             </a:pPr>
             <a:r>
               <a:rPr lang="en-GB" sz="3200" strike="noStrike">
@@ -6856,7 +6856,7 @@
               </a:lnSpc>
               <a:buSzPct val="45000"/>
               <a:buFont typeface="StarSymbol"/>
-              <a:buChar char=""/>
+              <a:buChar char="l"/>
             </a:pPr>
             <a:r>
               <a:rPr lang="en-GB" sz="3200" strike="noStrike">
@@ -6877,7 +6877,7 @@
               </a:lnSpc>
               <a:buSzPct val="45000"/>
               <a:buFont typeface="StarSymbol"/>
-              <a:buChar char=""/>
+              <a:buChar char="l"/>
             </a:pPr>
             <a:r>
               <a:rPr lang="en-GB" sz="3200" strike="noStrike">
@@ -6898,7 +6898,7 @@
               </a:lnSpc>
               <a:buSzPct val="45000"/>
               <a:buFont typeface="StarSymbol"/>
-              <a:buChar char=""/>
+              <a:buChar char="l"/>
             </a:pPr>
             <a:r>
               <a:rPr lang="en-GB" sz="3200" strike="noStrike">
@@ -6919,7 +6919,7 @@
               </a:lnSpc>
               <a:buSzPct val="45000"/>
               <a:buFont typeface="StarSymbol"/>
-              <a:buChar char=""/>
+              <a:buChar char="l"/>
             </a:pPr>
             <a:r>
               <a:rPr lang="en-GB" sz="3200" strike="noStrike">
@@ -6993,7 +6993,7 @@
         <p:spPr>
           <a:xfrm>
             <a:off x="838080" y="685800"/>
-            <a:ext cx="8227440" cy="1140840"/>
+            <a:ext cx="8227080" cy="1140480"/>
           </a:xfrm>
           <a:prstGeom prst="rect">
             <a:avLst/>
@@ -7040,7 +7040,7 @@
         <p:spPr>
           <a:xfrm>
             <a:off x="762120" y="1676520"/>
-            <a:ext cx="7617960" cy="4523760"/>
+            <a:ext cx="7617600" cy="4523400"/>
           </a:xfrm>
           <a:prstGeom prst="rect">
             <a:avLst/>
@@ -7105,7 +7105,7 @@
         <p:spPr>
           <a:xfrm>
             <a:off x="3505320" y="2057400"/>
-            <a:ext cx="2417040" cy="2417040"/>
+            <a:ext cx="2416680" cy="2416680"/>
           </a:xfrm>
           <a:prstGeom prst="rect">
             <a:avLst/>
@@ -7173,7 +7173,7 @@
         <p:spPr>
           <a:xfrm>
             <a:off x="838080" y="685800"/>
-            <a:ext cx="8227440" cy="1140840"/>
+            <a:ext cx="8227080" cy="1140480"/>
           </a:xfrm>
           <a:prstGeom prst="rect">
             <a:avLst/>
@@ -7220,7 +7220,7 @@
         <p:spPr>
           <a:xfrm>
             <a:off x="762120" y="1676520"/>
-            <a:ext cx="7846560" cy="4523760"/>
+            <a:ext cx="7846200" cy="4523400"/>
           </a:xfrm>
           <a:prstGeom prst="rect">
             <a:avLst/>
@@ -7252,8 +7252,19 @@
                 <a:latin typeface="Calibri"/>
                 <a:ea typeface="DejaVu Sans"/>
               </a:rPr>
-              <a:t>Напишете Regression test сюита (не повече от 10 теста), който има за цел бързо да се изтества най-основната функционалност на сайта </a:t>
-            </a:r>
+              <a:t>Напишете Regression test сюита (не повече от 10 теста), който има за цел бързо да се изтества най-основната функционалност на сайта http://qa.soft-intellect.com/ </a:t>
+            </a:r>
+            <a:endParaRPr/>
+          </a:p>
+          <a:p>
+            <a:pPr lvl="2">
+              <a:lnSpc>
+                <a:spcPct val="100000"/>
+              </a:lnSpc>
+              <a:buSzPct val="45000"/>
+              <a:buFont typeface="StarSymbol"/>
+              <a:buChar char="l"/>
+            </a:pPr>
             <a:r>
               <a:rPr lang="en-GB" sz="3200" strike="noStrike">
                 <a:solidFill>
@@ -7262,8 +7273,19 @@
                 <a:latin typeface="Calibri"/>
                 <a:ea typeface="DejaVu Sans"/>
               </a:rPr>
-              <a:t>http://qa.soft-intellect.com/</a:t>
-            </a:r>
+              <a:t>Pages.</a:t>
+            </a:r>
+            <a:endParaRPr/>
+          </a:p>
+          <a:p>
+            <a:pPr lvl="2">
+              <a:lnSpc>
+                <a:spcPct val="100000"/>
+              </a:lnSpc>
+              <a:buSzPct val="45000"/>
+              <a:buFont typeface="StarSymbol"/>
+              <a:buChar char="l"/>
+            </a:pPr>
             <a:r>
               <a:rPr lang="en-GB" sz="3200" strike="noStrike">
                 <a:solidFill>
@@ -7272,7 +7294,7 @@
                 <a:latin typeface="Calibri"/>
                 <a:ea typeface="DejaVu Sans"/>
               </a:rPr>
-              <a:t> </a:t>
+              <a:t>Posts.</a:t>
             </a:r>
             <a:endParaRPr/>
           </a:p>
@@ -7283,49 +7305,7 @@
               </a:lnSpc>
               <a:buSzPct val="45000"/>
               <a:buFont typeface="StarSymbol"/>
-              <a:buChar char=""/>
-            </a:pPr>
-            <a:r>
-              <a:rPr lang="en-GB" sz="3200" strike="noStrike">
-                <a:solidFill>
-                  <a:srgbClr val="f2f2f2"/>
-                </a:solidFill>
-                <a:latin typeface="Calibri"/>
-                <a:ea typeface="DejaVu Sans"/>
-              </a:rPr>
-              <a:t>Pages.</a:t>
-            </a:r>
-            <a:endParaRPr/>
-          </a:p>
-          <a:p>
-            <a:pPr lvl="2">
-              <a:lnSpc>
-                <a:spcPct val="100000"/>
-              </a:lnSpc>
-              <a:buSzPct val="45000"/>
-              <a:buFont typeface="StarSymbol"/>
-              <a:buChar char=""/>
-            </a:pPr>
-            <a:r>
-              <a:rPr lang="en-GB" sz="3200" strike="noStrike">
-                <a:solidFill>
-                  <a:srgbClr val="f2f2f2"/>
-                </a:solidFill>
-                <a:latin typeface="Calibri"/>
-                <a:ea typeface="DejaVu Sans"/>
-              </a:rPr>
-              <a:t>Posts.</a:t>
-            </a:r>
-            <a:endParaRPr/>
-          </a:p>
-          <a:p>
-            <a:pPr lvl="2">
-              <a:lnSpc>
-                <a:spcPct val="100000"/>
-              </a:lnSpc>
-              <a:buSzPct val="45000"/>
-              <a:buFont typeface="StarSymbol"/>
-              <a:buChar char=""/>
+              <a:buChar char="l"/>
             </a:pPr>
             <a:r>
               <a:rPr lang="en-GB" sz="3200" strike="noStrike">
@@ -7399,7 +7379,7 @@
         <p:spPr>
           <a:xfrm>
             <a:off x="838080" y="685800"/>
-            <a:ext cx="8227440" cy="1140840"/>
+            <a:ext cx="8227080" cy="1140480"/>
           </a:xfrm>
           <a:prstGeom prst="rect">
             <a:avLst/>
@@ -7446,7 +7426,7 @@
         <p:spPr>
           <a:xfrm>
             <a:off x="762120" y="1676520"/>
-            <a:ext cx="7846560" cy="4523760"/>
+            <a:ext cx="7846200" cy="4523400"/>
           </a:xfrm>
           <a:prstGeom prst="rect">
             <a:avLst/>
@@ -7471,7 +7451,7 @@
               </a:lnSpc>
               <a:buSzPct val="45000"/>
               <a:buFont typeface="StarSymbol"/>
-              <a:buChar char=""/>
+              <a:buChar char="l"/>
             </a:pPr>
             <a:r>
               <a:rPr lang="en-GB" sz="3200" strike="noStrike">
@@ -7492,7 +7472,7 @@
               </a:lnSpc>
               <a:buSzPct val="45000"/>
               <a:buFont typeface="StarSymbol"/>
-              <a:buChar char=""/>
+              <a:buChar char="l"/>
             </a:pPr>
             <a:r>
               <a:rPr lang="en-GB" sz="3200" strike="noStrike">
@@ -7513,7 +7493,7 @@
               </a:lnSpc>
               <a:buSzPct val="45000"/>
               <a:buFont typeface="StarSymbol"/>
-              <a:buChar char=""/>
+              <a:buChar char="l"/>
             </a:pPr>
             <a:r>
               <a:rPr lang="en-GB" sz="3200" strike="noStrike">
@@ -7587,7 +7567,7 @@
         <p:spPr>
           <a:xfrm>
             <a:off x="838080" y="685800"/>
-            <a:ext cx="8227440" cy="1140840"/>
+            <a:ext cx="8227080" cy="1140480"/>
           </a:xfrm>
           <a:prstGeom prst="rect">
             <a:avLst/>
@@ -7634,7 +7614,7 @@
         <p:spPr>
           <a:xfrm>
             <a:off x="762120" y="1676520"/>
-            <a:ext cx="7846560" cy="4523760"/>
+            <a:ext cx="7846200" cy="4523400"/>
           </a:xfrm>
           <a:prstGeom prst="rect">
             <a:avLst/>
@@ -7659,7 +7639,7 @@
               </a:lnSpc>
               <a:buSzPct val="45000"/>
               <a:buFont typeface="StarSymbol"/>
-              <a:buChar char=""/>
+              <a:buChar char="l"/>
             </a:pPr>
             <a:r>
               <a:rPr lang="en-GB" sz="3200" strike="noStrike">
@@ -7680,7 +7660,7 @@
               </a:lnSpc>
               <a:buSzPct val="45000"/>
               <a:buFont typeface="StarSymbol"/>
-              <a:buChar char=""/>
+              <a:buChar char="l"/>
             </a:pPr>
             <a:r>
               <a:rPr lang="en-GB" sz="3200" strike="noStrike">
@@ -7709,7 +7689,7 @@
         <p:spPr>
           <a:xfrm>
             <a:off x="3799800" y="4181760"/>
-            <a:ext cx="5200200" cy="2514240"/>
+            <a:ext cx="5199840" cy="2513880"/>
           </a:xfrm>
           <a:prstGeom prst="rect">
             <a:avLst/>
@@ -7777,7 +7757,7 @@
         <p:spPr>
           <a:xfrm>
             <a:off x="838080" y="685800"/>
-            <a:ext cx="8227440" cy="1140840"/>
+            <a:ext cx="8227080" cy="1140480"/>
           </a:xfrm>
           <a:prstGeom prst="rect">
             <a:avLst/>
@@ -7824,7 +7804,7 @@
         <p:spPr>
           <a:xfrm>
             <a:off x="762120" y="1676520"/>
-            <a:ext cx="7846560" cy="4523760"/>
+            <a:ext cx="7846200" cy="4523400"/>
           </a:xfrm>
           <a:prstGeom prst="rect">
             <a:avLst/>
@@ -7849,7 +7829,7 @@
               </a:lnSpc>
               <a:buSzPct val="45000"/>
               <a:buFont typeface="StarSymbol"/>
-              <a:buChar char=""/>
+              <a:buChar char="l"/>
             </a:pPr>
             <a:r>
               <a:rPr lang="en-GB" sz="3200" strike="noStrike">
@@ -7870,7 +7850,7 @@
               </a:lnSpc>
               <a:buSzPct val="45000"/>
               <a:buFont typeface="StarSymbol"/>
-              <a:buChar char=""/>
+              <a:buChar char="l"/>
             </a:pPr>
             <a:r>
               <a:rPr lang="en-GB" sz="3200" strike="noStrike">
@@ -7889,9 +7869,6 @@
               <a:lnSpc>
                 <a:spcPct val="100000"/>
               </a:lnSpc>
-              <a:buSzPct val="45000"/>
-              <a:buFont typeface="StarSymbol"/>
-              <a:buChar char=""/>
             </a:pPr>
             <a:endParaRPr/>
           </a:p>
@@ -7910,7 +7887,7 @@
         <p:spPr>
           <a:xfrm>
             <a:off x="5112000" y="4032000"/>
-            <a:ext cx="3580200" cy="2448000"/>
+            <a:ext cx="3579840" cy="2447640"/>
           </a:xfrm>
           <a:prstGeom prst="rect">
             <a:avLst/>
@@ -7978,7 +7955,7 @@
         <p:spPr>
           <a:xfrm>
             <a:off x="838080" y="685800"/>
-            <a:ext cx="8227440" cy="1140840"/>
+            <a:ext cx="8227080" cy="1140480"/>
           </a:xfrm>
           <a:prstGeom prst="rect">
             <a:avLst/>
@@ -8025,7 +8002,7 @@
         <p:spPr>
           <a:xfrm>
             <a:off x="762120" y="1676520"/>
-            <a:ext cx="7846560" cy="4523760"/>
+            <a:ext cx="7846200" cy="4523400"/>
           </a:xfrm>
           <a:prstGeom prst="rect">
             <a:avLst/>
@@ -8049,7 +8026,7 @@
                 <a:spcPct val="100000"/>
               </a:lnSpc>
               <a:buFont typeface="StarSymbol"/>
-              <a:buChar char=""/>
+              <a:buChar char="l"/>
             </a:pPr>
             <a:r>
               <a:rPr lang="en-GB" sz="3200" strike="noStrike">
@@ -8069,7 +8046,7 @@
                 <a:spcPct val="100000"/>
               </a:lnSpc>
               <a:buFont typeface="StarSymbol"/>
-              <a:buChar char=""/>
+              <a:buChar char="l"/>
             </a:pPr>
             <a:r>
               <a:rPr lang="en-GB" sz="3200" strike="noStrike">
@@ -8098,7 +8075,7 @@
         <p:spPr>
           <a:xfrm>
             <a:off x="4320000" y="3744000"/>
-            <a:ext cx="4690080" cy="2993040"/>
+            <a:ext cx="4689720" cy="2992680"/>
           </a:xfrm>
           <a:prstGeom prst="rect">
             <a:avLst/>
@@ -8166,7 +8143,7 @@
         <p:spPr>
           <a:xfrm>
             <a:off x="838080" y="685800"/>
-            <a:ext cx="8227440" cy="1140840"/>
+            <a:ext cx="8227080" cy="1140480"/>
           </a:xfrm>
           <a:prstGeom prst="rect">
             <a:avLst/>
@@ -8213,7 +8190,7 @@
         <p:spPr>
           <a:xfrm>
             <a:off x="762120" y="1676520"/>
-            <a:ext cx="7846560" cy="4523760"/>
+            <a:ext cx="7846200" cy="4523400"/>
           </a:xfrm>
           <a:prstGeom prst="rect">
             <a:avLst/>
@@ -8238,7 +8215,7 @@
               </a:lnSpc>
               <a:buSzPct val="45000"/>
               <a:buFont typeface="StarSymbol"/>
-              <a:buChar char=""/>
+              <a:buChar char="l"/>
             </a:pPr>
             <a:r>
               <a:rPr lang="en-GB" sz="3200" strike="noStrike">
@@ -8259,7 +8236,7 @@
               </a:lnSpc>
               <a:buSzPct val="45000"/>
               <a:buFont typeface="StarSymbol"/>
-              <a:buChar char=""/>
+              <a:buChar char="l"/>
             </a:pPr>
             <a:r>
               <a:rPr lang="en-GB" sz="3200" strike="noStrike">
@@ -8333,7 +8310,7 @@
         <p:spPr>
           <a:xfrm>
             <a:off x="838080" y="685800"/>
-            <a:ext cx="8227440" cy="1140840"/>
+            <a:ext cx="8227080" cy="1140480"/>
           </a:xfrm>
           <a:prstGeom prst="rect">
             <a:avLst/>
@@ -8380,7 +8357,7 @@
         <p:spPr>
           <a:xfrm>
             <a:off x="762120" y="1676520"/>
-            <a:ext cx="7846560" cy="4523760"/>
+            <a:ext cx="7846200" cy="4523400"/>
           </a:xfrm>
           <a:prstGeom prst="rect">
             <a:avLst/>
@@ -8405,7 +8382,7 @@
               </a:lnSpc>
               <a:buSzPct val="45000"/>
               <a:buFont typeface="StarSymbol"/>
-              <a:buChar char=""/>
+              <a:buChar char="l"/>
             </a:pPr>
             <a:r>
               <a:rPr lang="en-GB" sz="3200" strike="noStrike">
@@ -8426,7 +8403,7 @@
               </a:lnSpc>
               <a:buSzPct val="45000"/>
               <a:buFont typeface="StarSymbol"/>
-              <a:buChar char=""/>
+              <a:buChar char="l"/>
             </a:pPr>
             <a:r>
               <a:rPr lang="en-GB" sz="3200" strike="noStrike">
@@ -8500,7 +8477,7 @@
         <p:spPr>
           <a:xfrm>
             <a:off x="838080" y="685800"/>
-            <a:ext cx="8227440" cy="1140840"/>
+            <a:ext cx="8227080" cy="1140480"/>
           </a:xfrm>
           <a:prstGeom prst="rect">
             <a:avLst/>
@@ -8547,7 +8524,7 @@
         <p:spPr>
           <a:xfrm>
             <a:off x="762120" y="1676520"/>
-            <a:ext cx="7846560" cy="4523760"/>
+            <a:ext cx="7846200" cy="4523400"/>
           </a:xfrm>
           <a:prstGeom prst="rect">
             <a:avLst/>
@@ -8572,7 +8549,7 @@
               </a:lnSpc>
               <a:buSzPct val="45000"/>
               <a:buFont typeface="StarSymbol"/>
-              <a:buChar char=""/>
+              <a:buChar char="l"/>
             </a:pPr>
             <a:r>
               <a:rPr lang="en-GB" sz="3200" strike="noStrike">
@@ -8593,7 +8570,7 @@
               </a:lnSpc>
               <a:buSzPct val="45000"/>
               <a:buFont typeface="StarSymbol"/>
-              <a:buChar char=""/>
+              <a:buChar char="l"/>
             </a:pPr>
             <a:r>
               <a:rPr lang="en-GB" sz="3200" strike="noStrike">
@@ -8614,7 +8591,7 @@
               </a:lnSpc>
               <a:buSzPct val="45000"/>
               <a:buFont typeface="StarSymbol"/>
-              <a:buChar char=""/>
+              <a:buChar char="l"/>
             </a:pPr>
             <a:r>
               <a:rPr lang="en-GB" sz="3200" strike="noStrike">
@@ -8635,7 +8612,7 @@
               </a:lnSpc>
               <a:buSzPct val="45000"/>
               <a:buFont typeface="StarSymbol"/>
-              <a:buChar char=""/>
+              <a:buChar char="l"/>
             </a:pPr>
             <a:r>
               <a:rPr lang="en-GB" sz="3200" strike="noStrike">
@@ -8664,7 +8641,7 @@
         <p:spPr>
           <a:xfrm>
             <a:off x="6264000" y="72000"/>
-            <a:ext cx="2808000" cy="2016000"/>
+            <a:ext cx="2807640" cy="2015640"/>
           </a:xfrm>
           <a:prstGeom prst="rect">
             <a:avLst/>

</xml_diff>